<commit_message>
Set theory clauses done
</commit_message>
<xml_diff>
--- a/Working with SQL/Set theory clauses.pptx
+++ b/Working with SQL/Set theory clauses.pptx
@@ -6,6 +6,17 @@
   </p:sldMasterIdLst>
   <p:sldIdLst>
     <p:sldId id="256" r:id="rId2"/>
+    <p:sldId id="257" r:id="rId3"/>
+    <p:sldId id="258" r:id="rId4"/>
+    <p:sldId id="259" r:id="rId5"/>
+    <p:sldId id="260" r:id="rId6"/>
+    <p:sldId id="261" r:id="rId7"/>
+    <p:sldId id="262" r:id="rId8"/>
+    <p:sldId id="263" r:id="rId9"/>
+    <p:sldId id="264" r:id="rId10"/>
+    <p:sldId id="265" r:id="rId11"/>
+    <p:sldId id="266" r:id="rId12"/>
+    <p:sldId id="267" r:id="rId13"/>
   </p:sldIdLst>
   <p:sldSz cx="12192000" cy="6858000"/>
   <p:notesSz cx="6858000" cy="9144000"/>
@@ -104,6 +115,11 @@
       </a:defRPr>
     </a:lvl9pPr>
   </p:defaultTextStyle>
+  <p:extLst>
+    <p:ext uri="{EFAFB233-063F-42B5-8137-9DF3F51BA10A}">
+      <p15:sldGuideLst xmlns:p15="http://schemas.microsoft.com/office/powerpoint/2012/main"/>
+    </p:ext>
+  </p:extLst>
 </p:presentation>
 </file>
 
@@ -254,7 +270,7 @@
           <a:p>
             <a:fld id="{DE2C5E95-7DE1-46DD-BFC6-4D3310A1AC10}" type="datetimeFigureOut">
               <a:rPr lang="en-US" smtClean="0"/>
-              <a:t>2/4/2023</a:t>
+              <a:t>3/3/2023</a:t>
             </a:fld>
             <a:endParaRPr lang="en-US"/>
           </a:p>
@@ -452,7 +468,7 @@
           <a:p>
             <a:fld id="{DE2C5E95-7DE1-46DD-BFC6-4D3310A1AC10}" type="datetimeFigureOut">
               <a:rPr lang="en-US" smtClean="0"/>
-              <a:t>2/4/2023</a:t>
+              <a:t>3/3/2023</a:t>
             </a:fld>
             <a:endParaRPr lang="en-US"/>
           </a:p>
@@ -660,7 +676,7 @@
           <a:p>
             <a:fld id="{DE2C5E95-7DE1-46DD-BFC6-4D3310A1AC10}" type="datetimeFigureOut">
               <a:rPr lang="en-US" smtClean="0"/>
-              <a:t>2/4/2023</a:t>
+              <a:t>3/3/2023</a:t>
             </a:fld>
             <a:endParaRPr lang="en-US"/>
           </a:p>
@@ -858,7 +874,7 @@
           <a:p>
             <a:fld id="{DE2C5E95-7DE1-46DD-BFC6-4D3310A1AC10}" type="datetimeFigureOut">
               <a:rPr lang="en-US" smtClean="0"/>
-              <a:t>2/4/2023</a:t>
+              <a:t>3/3/2023</a:t>
             </a:fld>
             <a:endParaRPr lang="en-US"/>
           </a:p>
@@ -1133,7 +1149,7 @@
           <a:p>
             <a:fld id="{DE2C5E95-7DE1-46DD-BFC6-4D3310A1AC10}" type="datetimeFigureOut">
               <a:rPr lang="en-US" smtClean="0"/>
-              <a:t>2/4/2023</a:t>
+              <a:t>3/3/2023</a:t>
             </a:fld>
             <a:endParaRPr lang="en-US"/>
           </a:p>
@@ -1398,7 +1414,7 @@
           <a:p>
             <a:fld id="{DE2C5E95-7DE1-46DD-BFC6-4D3310A1AC10}" type="datetimeFigureOut">
               <a:rPr lang="en-US" smtClean="0"/>
-              <a:t>2/4/2023</a:t>
+              <a:t>3/3/2023</a:t>
             </a:fld>
             <a:endParaRPr lang="en-US"/>
           </a:p>
@@ -1810,7 +1826,7 @@
           <a:p>
             <a:fld id="{DE2C5E95-7DE1-46DD-BFC6-4D3310A1AC10}" type="datetimeFigureOut">
               <a:rPr lang="en-US" smtClean="0"/>
-              <a:t>2/4/2023</a:t>
+              <a:t>3/3/2023</a:t>
             </a:fld>
             <a:endParaRPr lang="en-US"/>
           </a:p>
@@ -1951,7 +1967,7 @@
           <a:p>
             <a:fld id="{DE2C5E95-7DE1-46DD-BFC6-4D3310A1AC10}" type="datetimeFigureOut">
               <a:rPr lang="en-US" smtClean="0"/>
-              <a:t>2/4/2023</a:t>
+              <a:t>3/3/2023</a:t>
             </a:fld>
             <a:endParaRPr lang="en-US"/>
           </a:p>
@@ -2064,7 +2080,7 @@
           <a:p>
             <a:fld id="{DE2C5E95-7DE1-46DD-BFC6-4D3310A1AC10}" type="datetimeFigureOut">
               <a:rPr lang="en-US" smtClean="0"/>
-              <a:t>2/4/2023</a:t>
+              <a:t>3/3/2023</a:t>
             </a:fld>
             <a:endParaRPr lang="en-US"/>
           </a:p>
@@ -2375,7 +2391,7 @@
           <a:p>
             <a:fld id="{DE2C5E95-7DE1-46DD-BFC6-4D3310A1AC10}" type="datetimeFigureOut">
               <a:rPr lang="en-US" smtClean="0"/>
-              <a:t>2/4/2023</a:t>
+              <a:t>3/3/2023</a:t>
             </a:fld>
             <a:endParaRPr lang="en-US"/>
           </a:p>
@@ -2663,7 +2679,7 @@
           <a:p>
             <a:fld id="{DE2C5E95-7DE1-46DD-BFC6-4D3310A1AC10}" type="datetimeFigureOut">
               <a:rPr lang="en-US" smtClean="0"/>
-              <a:t>2/4/2023</a:t>
+              <a:t>3/3/2023</a:t>
             </a:fld>
             <a:endParaRPr lang="en-US"/>
           </a:p>
@@ -2904,7 +2920,7 @@
           <a:p>
             <a:fld id="{DE2C5E95-7DE1-46DD-BFC6-4D3310A1AC10}" type="datetimeFigureOut">
               <a:rPr lang="en-US" smtClean="0"/>
-              <a:t>2/4/2023</a:t>
+              <a:t>3/3/2023</a:t>
             </a:fld>
             <a:endParaRPr lang="en-US"/>
           </a:p>
@@ -3371,10 +3387,1250 @@
           </a:p>
         </p:txBody>
       </p:sp>
+      <p:pic>
+        <p:nvPicPr>
+          <p:cNvPr id="5" name="Picture 4">
+            <a:extLst>
+              <a:ext uri="{FF2B5EF4-FFF2-40B4-BE49-F238E27FC236}">
+                <a16:creationId xmlns:a16="http://schemas.microsoft.com/office/drawing/2014/main" id="{DDA1B875-E967-B068-9B74-31AA10FDAB95}"/>
+              </a:ext>
+            </a:extLst>
+          </p:cNvPr>
+          <p:cNvPicPr>
+            <a:picLocks noChangeAspect="1"/>
+          </p:cNvPicPr>
+          <p:nvPr/>
+        </p:nvPicPr>
+        <p:blipFill>
+          <a:blip r:embed="rId2"/>
+          <a:stretch>
+            <a:fillRect/>
+          </a:stretch>
+        </p:blipFill>
+        <p:spPr>
+          <a:xfrm>
+            <a:off x="0" y="0"/>
+            <a:ext cx="12192000" cy="6858000"/>
+          </a:xfrm>
+          <a:prstGeom prst="rect">
+            <a:avLst/>
+          </a:prstGeom>
+        </p:spPr>
+      </p:pic>
     </p:spTree>
     <p:extLst>
       <p:ext uri="{BB962C8B-B14F-4D97-AF65-F5344CB8AC3E}">
         <p14:creationId xmlns:p14="http://schemas.microsoft.com/office/powerpoint/2010/main" val="4172029492"/>
+      </p:ext>
+    </p:extLst>
+  </p:cSld>
+  <p:clrMapOvr>
+    <a:masterClrMapping/>
+  </p:clrMapOvr>
+</p:sld>
+</file>
+
+<file path=ppt/slides/slide10.xml><?xml version="1.0" encoding="utf-8"?>
+<p:sld xmlns:a="http://schemas.openxmlformats.org/drawingml/2006/main" xmlns:r="http://schemas.openxmlformats.org/officeDocument/2006/relationships" xmlns:p="http://schemas.openxmlformats.org/presentationml/2006/main">
+  <p:cSld>
+    <p:spTree>
+      <p:nvGrpSpPr>
+        <p:cNvPr id="1" name=""/>
+        <p:cNvGrpSpPr/>
+        <p:nvPr/>
+      </p:nvGrpSpPr>
+      <p:grpSpPr>
+        <a:xfrm>
+          <a:off x="0" y="0"/>
+          <a:ext cx="0" cy="0"/>
+          <a:chOff x="0" y="0"/>
+          <a:chExt cx="0" cy="0"/>
+        </a:xfrm>
+      </p:grpSpPr>
+      <p:sp>
+        <p:nvSpPr>
+          <p:cNvPr id="2" name="Title 1">
+            <a:extLst>
+              <a:ext uri="{FF2B5EF4-FFF2-40B4-BE49-F238E27FC236}">
+                <a16:creationId xmlns:a16="http://schemas.microsoft.com/office/drawing/2014/main" id="{6B073D81-14AE-5FE2-37E9-041662B1EA97}"/>
+              </a:ext>
+            </a:extLst>
+          </p:cNvPr>
+          <p:cNvSpPr>
+            <a:spLocks noGrp="1"/>
+          </p:cNvSpPr>
+          <p:nvPr>
+            <p:ph type="title"/>
+          </p:nvPr>
+        </p:nvSpPr>
+        <p:spPr/>
+        <p:txBody>
+          <a:bodyPr/>
+          <a:lstStyle/>
+          <a:p>
+            <a:endParaRPr lang="en-US"/>
+          </a:p>
+        </p:txBody>
+      </p:sp>
+      <p:sp>
+        <p:nvSpPr>
+          <p:cNvPr id="3" name="Content Placeholder 2">
+            <a:extLst>
+              <a:ext uri="{FF2B5EF4-FFF2-40B4-BE49-F238E27FC236}">
+                <a16:creationId xmlns:a16="http://schemas.microsoft.com/office/drawing/2014/main" id="{A8DCD231-5A2E-5AC0-B2AB-5CF22B6311B0}"/>
+              </a:ext>
+            </a:extLst>
+          </p:cNvPr>
+          <p:cNvSpPr>
+            <a:spLocks noGrp="1"/>
+          </p:cNvSpPr>
+          <p:nvPr>
+            <p:ph idx="1"/>
+          </p:nvPr>
+        </p:nvSpPr>
+        <p:spPr/>
+        <p:txBody>
+          <a:bodyPr/>
+          <a:lstStyle/>
+          <a:p>
+            <a:endParaRPr lang="en-US"/>
+          </a:p>
+        </p:txBody>
+      </p:sp>
+      <p:pic>
+        <p:nvPicPr>
+          <p:cNvPr id="5" name="Picture 4">
+            <a:extLst>
+              <a:ext uri="{FF2B5EF4-FFF2-40B4-BE49-F238E27FC236}">
+                <a16:creationId xmlns:a16="http://schemas.microsoft.com/office/drawing/2014/main" id="{BD457065-46FA-E831-E63A-7CC4EF51DAEB}"/>
+              </a:ext>
+            </a:extLst>
+          </p:cNvPr>
+          <p:cNvPicPr>
+            <a:picLocks noChangeAspect="1"/>
+          </p:cNvPicPr>
+          <p:nvPr/>
+        </p:nvPicPr>
+        <p:blipFill>
+          <a:blip r:embed="rId2"/>
+          <a:stretch>
+            <a:fillRect/>
+          </a:stretch>
+        </p:blipFill>
+        <p:spPr>
+          <a:xfrm>
+            <a:off x="0" y="0"/>
+            <a:ext cx="12192000" cy="6858000"/>
+          </a:xfrm>
+          <a:prstGeom prst="rect">
+            <a:avLst/>
+          </a:prstGeom>
+        </p:spPr>
+      </p:pic>
+    </p:spTree>
+    <p:extLst>
+      <p:ext uri="{BB962C8B-B14F-4D97-AF65-F5344CB8AC3E}">
+        <p14:creationId xmlns:p14="http://schemas.microsoft.com/office/powerpoint/2010/main" val="4023404506"/>
+      </p:ext>
+    </p:extLst>
+  </p:cSld>
+  <p:clrMapOvr>
+    <a:masterClrMapping/>
+  </p:clrMapOvr>
+</p:sld>
+</file>
+
+<file path=ppt/slides/slide11.xml><?xml version="1.0" encoding="utf-8"?>
+<p:sld xmlns:a="http://schemas.openxmlformats.org/drawingml/2006/main" xmlns:r="http://schemas.openxmlformats.org/officeDocument/2006/relationships" xmlns:p="http://schemas.openxmlformats.org/presentationml/2006/main">
+  <p:cSld>
+    <p:spTree>
+      <p:nvGrpSpPr>
+        <p:cNvPr id="1" name=""/>
+        <p:cNvGrpSpPr/>
+        <p:nvPr/>
+      </p:nvGrpSpPr>
+      <p:grpSpPr>
+        <a:xfrm>
+          <a:off x="0" y="0"/>
+          <a:ext cx="0" cy="0"/>
+          <a:chOff x="0" y="0"/>
+          <a:chExt cx="0" cy="0"/>
+        </a:xfrm>
+      </p:grpSpPr>
+      <p:sp>
+        <p:nvSpPr>
+          <p:cNvPr id="2" name="Title 1">
+            <a:extLst>
+              <a:ext uri="{FF2B5EF4-FFF2-40B4-BE49-F238E27FC236}">
+                <a16:creationId xmlns:a16="http://schemas.microsoft.com/office/drawing/2014/main" id="{A5C71575-90A6-8FCC-2587-064CE2AC7878}"/>
+              </a:ext>
+            </a:extLst>
+          </p:cNvPr>
+          <p:cNvSpPr>
+            <a:spLocks noGrp="1"/>
+          </p:cNvSpPr>
+          <p:nvPr>
+            <p:ph type="title"/>
+          </p:nvPr>
+        </p:nvSpPr>
+        <p:spPr/>
+        <p:txBody>
+          <a:bodyPr/>
+          <a:lstStyle/>
+          <a:p>
+            <a:endParaRPr lang="en-US"/>
+          </a:p>
+        </p:txBody>
+      </p:sp>
+      <p:sp>
+        <p:nvSpPr>
+          <p:cNvPr id="3" name="Content Placeholder 2">
+            <a:extLst>
+              <a:ext uri="{FF2B5EF4-FFF2-40B4-BE49-F238E27FC236}">
+                <a16:creationId xmlns:a16="http://schemas.microsoft.com/office/drawing/2014/main" id="{50C33E50-FEC4-E300-107D-D07FCCFF70A6}"/>
+              </a:ext>
+            </a:extLst>
+          </p:cNvPr>
+          <p:cNvSpPr>
+            <a:spLocks noGrp="1"/>
+          </p:cNvSpPr>
+          <p:nvPr>
+            <p:ph idx="1"/>
+          </p:nvPr>
+        </p:nvSpPr>
+        <p:spPr/>
+        <p:txBody>
+          <a:bodyPr/>
+          <a:lstStyle/>
+          <a:p>
+            <a:endParaRPr lang="en-US"/>
+          </a:p>
+        </p:txBody>
+      </p:sp>
+      <p:pic>
+        <p:nvPicPr>
+          <p:cNvPr id="5" name="Picture 4">
+            <a:extLst>
+              <a:ext uri="{FF2B5EF4-FFF2-40B4-BE49-F238E27FC236}">
+                <a16:creationId xmlns:a16="http://schemas.microsoft.com/office/drawing/2014/main" id="{C74C85CA-24FF-BFEF-F4FA-9D3CC3A54146}"/>
+              </a:ext>
+            </a:extLst>
+          </p:cNvPr>
+          <p:cNvPicPr>
+            <a:picLocks noChangeAspect="1"/>
+          </p:cNvPicPr>
+          <p:nvPr/>
+        </p:nvPicPr>
+        <p:blipFill>
+          <a:blip r:embed="rId2"/>
+          <a:stretch>
+            <a:fillRect/>
+          </a:stretch>
+        </p:blipFill>
+        <p:spPr>
+          <a:xfrm>
+            <a:off x="0" y="0"/>
+            <a:ext cx="12192000" cy="6858000"/>
+          </a:xfrm>
+          <a:prstGeom prst="rect">
+            <a:avLst/>
+          </a:prstGeom>
+        </p:spPr>
+      </p:pic>
+    </p:spTree>
+    <p:extLst>
+      <p:ext uri="{BB962C8B-B14F-4D97-AF65-F5344CB8AC3E}">
+        <p14:creationId xmlns:p14="http://schemas.microsoft.com/office/powerpoint/2010/main" val="275413530"/>
+      </p:ext>
+    </p:extLst>
+  </p:cSld>
+  <p:clrMapOvr>
+    <a:masterClrMapping/>
+  </p:clrMapOvr>
+</p:sld>
+</file>
+
+<file path=ppt/slides/slide12.xml><?xml version="1.0" encoding="utf-8"?>
+<p:sld xmlns:a="http://schemas.openxmlformats.org/drawingml/2006/main" xmlns:r="http://schemas.openxmlformats.org/officeDocument/2006/relationships" xmlns:p="http://schemas.openxmlformats.org/presentationml/2006/main">
+  <p:cSld>
+    <p:spTree>
+      <p:nvGrpSpPr>
+        <p:cNvPr id="1" name=""/>
+        <p:cNvGrpSpPr/>
+        <p:nvPr/>
+      </p:nvGrpSpPr>
+      <p:grpSpPr>
+        <a:xfrm>
+          <a:off x="0" y="0"/>
+          <a:ext cx="0" cy="0"/>
+          <a:chOff x="0" y="0"/>
+          <a:chExt cx="0" cy="0"/>
+        </a:xfrm>
+      </p:grpSpPr>
+      <p:sp>
+        <p:nvSpPr>
+          <p:cNvPr id="2" name="Title 1">
+            <a:extLst>
+              <a:ext uri="{FF2B5EF4-FFF2-40B4-BE49-F238E27FC236}">
+                <a16:creationId xmlns:a16="http://schemas.microsoft.com/office/drawing/2014/main" id="{608C461D-0995-BC06-7AB0-2B03C899ED78}"/>
+              </a:ext>
+            </a:extLst>
+          </p:cNvPr>
+          <p:cNvSpPr>
+            <a:spLocks noGrp="1"/>
+          </p:cNvSpPr>
+          <p:nvPr>
+            <p:ph type="title"/>
+          </p:nvPr>
+        </p:nvSpPr>
+        <p:spPr/>
+        <p:txBody>
+          <a:bodyPr/>
+          <a:lstStyle/>
+          <a:p>
+            <a:endParaRPr lang="en-US"/>
+          </a:p>
+        </p:txBody>
+      </p:sp>
+      <p:sp>
+        <p:nvSpPr>
+          <p:cNvPr id="3" name="Content Placeholder 2">
+            <a:extLst>
+              <a:ext uri="{FF2B5EF4-FFF2-40B4-BE49-F238E27FC236}">
+                <a16:creationId xmlns:a16="http://schemas.microsoft.com/office/drawing/2014/main" id="{E040C0AF-3ED3-C10A-F4E8-EBCADD1859F6}"/>
+              </a:ext>
+            </a:extLst>
+          </p:cNvPr>
+          <p:cNvSpPr>
+            <a:spLocks noGrp="1"/>
+          </p:cNvSpPr>
+          <p:nvPr>
+            <p:ph idx="1"/>
+          </p:nvPr>
+        </p:nvSpPr>
+        <p:spPr/>
+        <p:txBody>
+          <a:bodyPr/>
+          <a:lstStyle/>
+          <a:p>
+            <a:endParaRPr lang="en-US"/>
+          </a:p>
+        </p:txBody>
+      </p:sp>
+      <p:pic>
+        <p:nvPicPr>
+          <p:cNvPr id="5" name="Picture 4">
+            <a:extLst>
+              <a:ext uri="{FF2B5EF4-FFF2-40B4-BE49-F238E27FC236}">
+                <a16:creationId xmlns:a16="http://schemas.microsoft.com/office/drawing/2014/main" id="{EA0883BE-A72B-57A0-BFAF-D2D74B2C4093}"/>
+              </a:ext>
+            </a:extLst>
+          </p:cNvPr>
+          <p:cNvPicPr>
+            <a:picLocks noChangeAspect="1"/>
+          </p:cNvPicPr>
+          <p:nvPr/>
+        </p:nvPicPr>
+        <p:blipFill>
+          <a:blip r:embed="rId2"/>
+          <a:stretch>
+            <a:fillRect/>
+          </a:stretch>
+        </p:blipFill>
+        <p:spPr>
+          <a:xfrm>
+            <a:off x="0" y="0"/>
+            <a:ext cx="12192000" cy="6858000"/>
+          </a:xfrm>
+          <a:prstGeom prst="rect">
+            <a:avLst/>
+          </a:prstGeom>
+        </p:spPr>
+      </p:pic>
+    </p:spTree>
+    <p:extLst>
+      <p:ext uri="{BB962C8B-B14F-4D97-AF65-F5344CB8AC3E}">
+        <p14:creationId xmlns:p14="http://schemas.microsoft.com/office/powerpoint/2010/main" val="3212231701"/>
+      </p:ext>
+    </p:extLst>
+  </p:cSld>
+  <p:clrMapOvr>
+    <a:masterClrMapping/>
+  </p:clrMapOvr>
+</p:sld>
+</file>
+
+<file path=ppt/slides/slide2.xml><?xml version="1.0" encoding="utf-8"?>
+<p:sld xmlns:a="http://schemas.openxmlformats.org/drawingml/2006/main" xmlns:r="http://schemas.openxmlformats.org/officeDocument/2006/relationships" xmlns:p="http://schemas.openxmlformats.org/presentationml/2006/main">
+  <p:cSld>
+    <p:spTree>
+      <p:nvGrpSpPr>
+        <p:cNvPr id="1" name=""/>
+        <p:cNvGrpSpPr/>
+        <p:nvPr/>
+      </p:nvGrpSpPr>
+      <p:grpSpPr>
+        <a:xfrm>
+          <a:off x="0" y="0"/>
+          <a:ext cx="0" cy="0"/>
+          <a:chOff x="0" y="0"/>
+          <a:chExt cx="0" cy="0"/>
+        </a:xfrm>
+      </p:grpSpPr>
+      <p:sp>
+        <p:nvSpPr>
+          <p:cNvPr id="2" name="Title 1">
+            <a:extLst>
+              <a:ext uri="{FF2B5EF4-FFF2-40B4-BE49-F238E27FC236}">
+                <a16:creationId xmlns:a16="http://schemas.microsoft.com/office/drawing/2014/main" id="{070C926B-A8F6-5190-CB4C-AC33DEAEE303}"/>
+              </a:ext>
+            </a:extLst>
+          </p:cNvPr>
+          <p:cNvSpPr>
+            <a:spLocks noGrp="1"/>
+          </p:cNvSpPr>
+          <p:nvPr>
+            <p:ph type="title"/>
+          </p:nvPr>
+        </p:nvSpPr>
+        <p:spPr/>
+        <p:txBody>
+          <a:bodyPr/>
+          <a:lstStyle/>
+          <a:p>
+            <a:endParaRPr lang="en-US"/>
+          </a:p>
+        </p:txBody>
+      </p:sp>
+      <p:sp>
+        <p:nvSpPr>
+          <p:cNvPr id="3" name="Content Placeholder 2">
+            <a:extLst>
+              <a:ext uri="{FF2B5EF4-FFF2-40B4-BE49-F238E27FC236}">
+                <a16:creationId xmlns:a16="http://schemas.microsoft.com/office/drawing/2014/main" id="{2DCC9543-EEA5-7EDF-5767-BB12C4C1E1F8}"/>
+              </a:ext>
+            </a:extLst>
+          </p:cNvPr>
+          <p:cNvSpPr>
+            <a:spLocks noGrp="1"/>
+          </p:cNvSpPr>
+          <p:nvPr>
+            <p:ph idx="1"/>
+          </p:nvPr>
+        </p:nvSpPr>
+        <p:spPr/>
+        <p:txBody>
+          <a:bodyPr/>
+          <a:lstStyle/>
+          <a:p>
+            <a:endParaRPr lang="en-US"/>
+          </a:p>
+        </p:txBody>
+      </p:sp>
+      <p:pic>
+        <p:nvPicPr>
+          <p:cNvPr id="5" name="Picture 4">
+            <a:extLst>
+              <a:ext uri="{FF2B5EF4-FFF2-40B4-BE49-F238E27FC236}">
+                <a16:creationId xmlns:a16="http://schemas.microsoft.com/office/drawing/2014/main" id="{46DDBF3B-8907-68F7-BBDF-7554AB2988E0}"/>
+              </a:ext>
+            </a:extLst>
+          </p:cNvPr>
+          <p:cNvPicPr>
+            <a:picLocks noChangeAspect="1"/>
+          </p:cNvPicPr>
+          <p:nvPr/>
+        </p:nvPicPr>
+        <p:blipFill>
+          <a:blip r:embed="rId2"/>
+          <a:stretch>
+            <a:fillRect/>
+          </a:stretch>
+        </p:blipFill>
+        <p:spPr>
+          <a:xfrm>
+            <a:off x="0" y="0"/>
+            <a:ext cx="12192000" cy="6858000"/>
+          </a:xfrm>
+          <a:prstGeom prst="rect">
+            <a:avLst/>
+          </a:prstGeom>
+        </p:spPr>
+      </p:pic>
+    </p:spTree>
+    <p:extLst>
+      <p:ext uri="{BB962C8B-B14F-4D97-AF65-F5344CB8AC3E}">
+        <p14:creationId xmlns:p14="http://schemas.microsoft.com/office/powerpoint/2010/main" val="2447463735"/>
+      </p:ext>
+    </p:extLst>
+  </p:cSld>
+  <p:clrMapOvr>
+    <a:masterClrMapping/>
+  </p:clrMapOvr>
+</p:sld>
+</file>
+
+<file path=ppt/slides/slide3.xml><?xml version="1.0" encoding="utf-8"?>
+<p:sld xmlns:a="http://schemas.openxmlformats.org/drawingml/2006/main" xmlns:r="http://schemas.openxmlformats.org/officeDocument/2006/relationships" xmlns:p="http://schemas.openxmlformats.org/presentationml/2006/main">
+  <p:cSld>
+    <p:spTree>
+      <p:nvGrpSpPr>
+        <p:cNvPr id="1" name=""/>
+        <p:cNvGrpSpPr/>
+        <p:nvPr/>
+      </p:nvGrpSpPr>
+      <p:grpSpPr>
+        <a:xfrm>
+          <a:off x="0" y="0"/>
+          <a:ext cx="0" cy="0"/>
+          <a:chOff x="0" y="0"/>
+          <a:chExt cx="0" cy="0"/>
+        </a:xfrm>
+      </p:grpSpPr>
+      <p:sp>
+        <p:nvSpPr>
+          <p:cNvPr id="2" name="Title 1">
+            <a:extLst>
+              <a:ext uri="{FF2B5EF4-FFF2-40B4-BE49-F238E27FC236}">
+                <a16:creationId xmlns:a16="http://schemas.microsoft.com/office/drawing/2014/main" id="{849A732D-2279-6472-B970-4241C9BE575D}"/>
+              </a:ext>
+            </a:extLst>
+          </p:cNvPr>
+          <p:cNvSpPr>
+            <a:spLocks noGrp="1"/>
+          </p:cNvSpPr>
+          <p:nvPr>
+            <p:ph type="title"/>
+          </p:nvPr>
+        </p:nvSpPr>
+        <p:spPr/>
+        <p:txBody>
+          <a:bodyPr/>
+          <a:lstStyle/>
+          <a:p>
+            <a:endParaRPr lang="en-US"/>
+          </a:p>
+        </p:txBody>
+      </p:sp>
+      <p:sp>
+        <p:nvSpPr>
+          <p:cNvPr id="3" name="Content Placeholder 2">
+            <a:extLst>
+              <a:ext uri="{FF2B5EF4-FFF2-40B4-BE49-F238E27FC236}">
+                <a16:creationId xmlns:a16="http://schemas.microsoft.com/office/drawing/2014/main" id="{8B7FDCBC-F012-BCAB-B52C-6B44E1AC23D6}"/>
+              </a:ext>
+            </a:extLst>
+          </p:cNvPr>
+          <p:cNvSpPr>
+            <a:spLocks noGrp="1"/>
+          </p:cNvSpPr>
+          <p:nvPr>
+            <p:ph idx="1"/>
+          </p:nvPr>
+        </p:nvSpPr>
+        <p:spPr/>
+        <p:txBody>
+          <a:bodyPr/>
+          <a:lstStyle/>
+          <a:p>
+            <a:endParaRPr lang="en-US"/>
+          </a:p>
+        </p:txBody>
+      </p:sp>
+      <p:pic>
+        <p:nvPicPr>
+          <p:cNvPr id="5" name="Picture 4">
+            <a:extLst>
+              <a:ext uri="{FF2B5EF4-FFF2-40B4-BE49-F238E27FC236}">
+                <a16:creationId xmlns:a16="http://schemas.microsoft.com/office/drawing/2014/main" id="{7F8B3A2F-FEF9-A8D4-9512-3858BFF77BEF}"/>
+              </a:ext>
+            </a:extLst>
+          </p:cNvPr>
+          <p:cNvPicPr>
+            <a:picLocks noChangeAspect="1"/>
+          </p:cNvPicPr>
+          <p:nvPr/>
+        </p:nvPicPr>
+        <p:blipFill>
+          <a:blip r:embed="rId2"/>
+          <a:stretch>
+            <a:fillRect/>
+          </a:stretch>
+        </p:blipFill>
+        <p:spPr>
+          <a:xfrm>
+            <a:off x="0" y="0"/>
+            <a:ext cx="12192000" cy="6858000"/>
+          </a:xfrm>
+          <a:prstGeom prst="rect">
+            <a:avLst/>
+          </a:prstGeom>
+        </p:spPr>
+      </p:pic>
+    </p:spTree>
+    <p:extLst>
+      <p:ext uri="{BB962C8B-B14F-4D97-AF65-F5344CB8AC3E}">
+        <p14:creationId xmlns:p14="http://schemas.microsoft.com/office/powerpoint/2010/main" val="1769430849"/>
+      </p:ext>
+    </p:extLst>
+  </p:cSld>
+  <p:clrMapOvr>
+    <a:masterClrMapping/>
+  </p:clrMapOvr>
+</p:sld>
+</file>
+
+<file path=ppt/slides/slide4.xml><?xml version="1.0" encoding="utf-8"?>
+<p:sld xmlns:a="http://schemas.openxmlformats.org/drawingml/2006/main" xmlns:r="http://schemas.openxmlformats.org/officeDocument/2006/relationships" xmlns:p="http://schemas.openxmlformats.org/presentationml/2006/main">
+  <p:cSld>
+    <p:spTree>
+      <p:nvGrpSpPr>
+        <p:cNvPr id="1" name=""/>
+        <p:cNvGrpSpPr/>
+        <p:nvPr/>
+      </p:nvGrpSpPr>
+      <p:grpSpPr>
+        <a:xfrm>
+          <a:off x="0" y="0"/>
+          <a:ext cx="0" cy="0"/>
+          <a:chOff x="0" y="0"/>
+          <a:chExt cx="0" cy="0"/>
+        </a:xfrm>
+      </p:grpSpPr>
+      <p:sp>
+        <p:nvSpPr>
+          <p:cNvPr id="2" name="Title 1">
+            <a:extLst>
+              <a:ext uri="{FF2B5EF4-FFF2-40B4-BE49-F238E27FC236}">
+                <a16:creationId xmlns:a16="http://schemas.microsoft.com/office/drawing/2014/main" id="{986CF9B8-2499-8839-7392-EAADEAD66B43}"/>
+              </a:ext>
+            </a:extLst>
+          </p:cNvPr>
+          <p:cNvSpPr>
+            <a:spLocks noGrp="1"/>
+          </p:cNvSpPr>
+          <p:nvPr>
+            <p:ph type="title"/>
+          </p:nvPr>
+        </p:nvSpPr>
+        <p:spPr/>
+        <p:txBody>
+          <a:bodyPr/>
+          <a:lstStyle/>
+          <a:p>
+            <a:endParaRPr lang="en-US"/>
+          </a:p>
+        </p:txBody>
+      </p:sp>
+      <p:sp>
+        <p:nvSpPr>
+          <p:cNvPr id="3" name="Content Placeholder 2">
+            <a:extLst>
+              <a:ext uri="{FF2B5EF4-FFF2-40B4-BE49-F238E27FC236}">
+                <a16:creationId xmlns:a16="http://schemas.microsoft.com/office/drawing/2014/main" id="{6233A4BB-8ED7-0CA8-0E75-E059B6D1238C}"/>
+              </a:ext>
+            </a:extLst>
+          </p:cNvPr>
+          <p:cNvSpPr>
+            <a:spLocks noGrp="1"/>
+          </p:cNvSpPr>
+          <p:nvPr>
+            <p:ph idx="1"/>
+          </p:nvPr>
+        </p:nvSpPr>
+        <p:spPr/>
+        <p:txBody>
+          <a:bodyPr/>
+          <a:lstStyle/>
+          <a:p>
+            <a:endParaRPr lang="en-US"/>
+          </a:p>
+        </p:txBody>
+      </p:sp>
+      <p:pic>
+        <p:nvPicPr>
+          <p:cNvPr id="5" name="Picture 4">
+            <a:extLst>
+              <a:ext uri="{FF2B5EF4-FFF2-40B4-BE49-F238E27FC236}">
+                <a16:creationId xmlns:a16="http://schemas.microsoft.com/office/drawing/2014/main" id="{27CD2DBA-BF30-0211-F916-A12E783CA85A}"/>
+              </a:ext>
+            </a:extLst>
+          </p:cNvPr>
+          <p:cNvPicPr>
+            <a:picLocks noChangeAspect="1"/>
+          </p:cNvPicPr>
+          <p:nvPr/>
+        </p:nvPicPr>
+        <p:blipFill>
+          <a:blip r:embed="rId2"/>
+          <a:stretch>
+            <a:fillRect/>
+          </a:stretch>
+        </p:blipFill>
+        <p:spPr>
+          <a:xfrm>
+            <a:off x="0" y="0"/>
+            <a:ext cx="12192000" cy="6858000"/>
+          </a:xfrm>
+          <a:prstGeom prst="rect">
+            <a:avLst/>
+          </a:prstGeom>
+        </p:spPr>
+      </p:pic>
+    </p:spTree>
+    <p:extLst>
+      <p:ext uri="{BB962C8B-B14F-4D97-AF65-F5344CB8AC3E}">
+        <p14:creationId xmlns:p14="http://schemas.microsoft.com/office/powerpoint/2010/main" val="91293460"/>
+      </p:ext>
+    </p:extLst>
+  </p:cSld>
+  <p:clrMapOvr>
+    <a:masterClrMapping/>
+  </p:clrMapOvr>
+</p:sld>
+</file>
+
+<file path=ppt/slides/slide5.xml><?xml version="1.0" encoding="utf-8"?>
+<p:sld xmlns:a="http://schemas.openxmlformats.org/drawingml/2006/main" xmlns:r="http://schemas.openxmlformats.org/officeDocument/2006/relationships" xmlns:p="http://schemas.openxmlformats.org/presentationml/2006/main">
+  <p:cSld>
+    <p:spTree>
+      <p:nvGrpSpPr>
+        <p:cNvPr id="1" name=""/>
+        <p:cNvGrpSpPr/>
+        <p:nvPr/>
+      </p:nvGrpSpPr>
+      <p:grpSpPr>
+        <a:xfrm>
+          <a:off x="0" y="0"/>
+          <a:ext cx="0" cy="0"/>
+          <a:chOff x="0" y="0"/>
+          <a:chExt cx="0" cy="0"/>
+        </a:xfrm>
+      </p:grpSpPr>
+      <p:sp>
+        <p:nvSpPr>
+          <p:cNvPr id="2" name="Title 1">
+            <a:extLst>
+              <a:ext uri="{FF2B5EF4-FFF2-40B4-BE49-F238E27FC236}">
+                <a16:creationId xmlns:a16="http://schemas.microsoft.com/office/drawing/2014/main" id="{078B5758-736D-77CD-3732-5A6081A8FC23}"/>
+              </a:ext>
+            </a:extLst>
+          </p:cNvPr>
+          <p:cNvSpPr>
+            <a:spLocks noGrp="1"/>
+          </p:cNvSpPr>
+          <p:nvPr>
+            <p:ph type="title"/>
+          </p:nvPr>
+        </p:nvSpPr>
+        <p:spPr/>
+        <p:txBody>
+          <a:bodyPr/>
+          <a:lstStyle/>
+          <a:p>
+            <a:endParaRPr lang="en-US"/>
+          </a:p>
+        </p:txBody>
+      </p:sp>
+      <p:sp>
+        <p:nvSpPr>
+          <p:cNvPr id="3" name="Content Placeholder 2">
+            <a:extLst>
+              <a:ext uri="{FF2B5EF4-FFF2-40B4-BE49-F238E27FC236}">
+                <a16:creationId xmlns:a16="http://schemas.microsoft.com/office/drawing/2014/main" id="{C6D45E68-C2A9-9C3A-C04D-609D50211250}"/>
+              </a:ext>
+            </a:extLst>
+          </p:cNvPr>
+          <p:cNvSpPr>
+            <a:spLocks noGrp="1"/>
+          </p:cNvSpPr>
+          <p:nvPr>
+            <p:ph idx="1"/>
+          </p:nvPr>
+        </p:nvSpPr>
+        <p:spPr/>
+        <p:txBody>
+          <a:bodyPr/>
+          <a:lstStyle/>
+          <a:p>
+            <a:endParaRPr lang="en-US"/>
+          </a:p>
+        </p:txBody>
+      </p:sp>
+      <p:pic>
+        <p:nvPicPr>
+          <p:cNvPr id="5" name="Picture 4">
+            <a:extLst>
+              <a:ext uri="{FF2B5EF4-FFF2-40B4-BE49-F238E27FC236}">
+                <a16:creationId xmlns:a16="http://schemas.microsoft.com/office/drawing/2014/main" id="{FD6BB6E7-41D9-1826-B594-C8864AFA6402}"/>
+              </a:ext>
+            </a:extLst>
+          </p:cNvPr>
+          <p:cNvPicPr>
+            <a:picLocks noChangeAspect="1"/>
+          </p:cNvPicPr>
+          <p:nvPr/>
+        </p:nvPicPr>
+        <p:blipFill>
+          <a:blip r:embed="rId2"/>
+          <a:stretch>
+            <a:fillRect/>
+          </a:stretch>
+        </p:blipFill>
+        <p:spPr>
+          <a:xfrm>
+            <a:off x="0" y="0"/>
+            <a:ext cx="12192000" cy="6858000"/>
+          </a:xfrm>
+          <a:prstGeom prst="rect">
+            <a:avLst/>
+          </a:prstGeom>
+        </p:spPr>
+      </p:pic>
+    </p:spTree>
+    <p:extLst>
+      <p:ext uri="{BB962C8B-B14F-4D97-AF65-F5344CB8AC3E}">
+        <p14:creationId xmlns:p14="http://schemas.microsoft.com/office/powerpoint/2010/main" val="1234071914"/>
+      </p:ext>
+    </p:extLst>
+  </p:cSld>
+  <p:clrMapOvr>
+    <a:masterClrMapping/>
+  </p:clrMapOvr>
+</p:sld>
+</file>
+
+<file path=ppt/slides/slide6.xml><?xml version="1.0" encoding="utf-8"?>
+<p:sld xmlns:a="http://schemas.openxmlformats.org/drawingml/2006/main" xmlns:r="http://schemas.openxmlformats.org/officeDocument/2006/relationships" xmlns:p="http://schemas.openxmlformats.org/presentationml/2006/main">
+  <p:cSld>
+    <p:spTree>
+      <p:nvGrpSpPr>
+        <p:cNvPr id="1" name=""/>
+        <p:cNvGrpSpPr/>
+        <p:nvPr/>
+      </p:nvGrpSpPr>
+      <p:grpSpPr>
+        <a:xfrm>
+          <a:off x="0" y="0"/>
+          <a:ext cx="0" cy="0"/>
+          <a:chOff x="0" y="0"/>
+          <a:chExt cx="0" cy="0"/>
+        </a:xfrm>
+      </p:grpSpPr>
+      <p:sp>
+        <p:nvSpPr>
+          <p:cNvPr id="2" name="Title 1">
+            <a:extLst>
+              <a:ext uri="{FF2B5EF4-FFF2-40B4-BE49-F238E27FC236}">
+                <a16:creationId xmlns:a16="http://schemas.microsoft.com/office/drawing/2014/main" id="{397A9826-15DF-EA8E-44CC-0D774D875690}"/>
+              </a:ext>
+            </a:extLst>
+          </p:cNvPr>
+          <p:cNvSpPr>
+            <a:spLocks noGrp="1"/>
+          </p:cNvSpPr>
+          <p:nvPr>
+            <p:ph type="title"/>
+          </p:nvPr>
+        </p:nvSpPr>
+        <p:spPr/>
+        <p:txBody>
+          <a:bodyPr/>
+          <a:lstStyle/>
+          <a:p>
+            <a:endParaRPr lang="en-US"/>
+          </a:p>
+        </p:txBody>
+      </p:sp>
+      <p:sp>
+        <p:nvSpPr>
+          <p:cNvPr id="3" name="Content Placeholder 2">
+            <a:extLst>
+              <a:ext uri="{FF2B5EF4-FFF2-40B4-BE49-F238E27FC236}">
+                <a16:creationId xmlns:a16="http://schemas.microsoft.com/office/drawing/2014/main" id="{274C5BC6-901C-A0DE-66A4-274801BBDC16}"/>
+              </a:ext>
+            </a:extLst>
+          </p:cNvPr>
+          <p:cNvSpPr>
+            <a:spLocks noGrp="1"/>
+          </p:cNvSpPr>
+          <p:nvPr>
+            <p:ph idx="1"/>
+          </p:nvPr>
+        </p:nvSpPr>
+        <p:spPr/>
+        <p:txBody>
+          <a:bodyPr/>
+          <a:lstStyle/>
+          <a:p>
+            <a:endParaRPr lang="en-US"/>
+          </a:p>
+        </p:txBody>
+      </p:sp>
+      <p:pic>
+        <p:nvPicPr>
+          <p:cNvPr id="5" name="Picture 4">
+            <a:extLst>
+              <a:ext uri="{FF2B5EF4-FFF2-40B4-BE49-F238E27FC236}">
+                <a16:creationId xmlns:a16="http://schemas.microsoft.com/office/drawing/2014/main" id="{F512A2D5-A04A-E6E3-57FC-19C457CB7A3E}"/>
+              </a:ext>
+            </a:extLst>
+          </p:cNvPr>
+          <p:cNvPicPr>
+            <a:picLocks noChangeAspect="1"/>
+          </p:cNvPicPr>
+          <p:nvPr/>
+        </p:nvPicPr>
+        <p:blipFill>
+          <a:blip r:embed="rId2"/>
+          <a:stretch>
+            <a:fillRect/>
+          </a:stretch>
+        </p:blipFill>
+        <p:spPr>
+          <a:xfrm>
+            <a:off x="0" y="0"/>
+            <a:ext cx="12192000" cy="6858000"/>
+          </a:xfrm>
+          <a:prstGeom prst="rect">
+            <a:avLst/>
+          </a:prstGeom>
+        </p:spPr>
+      </p:pic>
+    </p:spTree>
+    <p:extLst>
+      <p:ext uri="{BB962C8B-B14F-4D97-AF65-F5344CB8AC3E}">
+        <p14:creationId xmlns:p14="http://schemas.microsoft.com/office/powerpoint/2010/main" val="644087399"/>
+      </p:ext>
+    </p:extLst>
+  </p:cSld>
+  <p:clrMapOvr>
+    <a:masterClrMapping/>
+  </p:clrMapOvr>
+</p:sld>
+</file>
+
+<file path=ppt/slides/slide7.xml><?xml version="1.0" encoding="utf-8"?>
+<p:sld xmlns:a="http://schemas.openxmlformats.org/drawingml/2006/main" xmlns:r="http://schemas.openxmlformats.org/officeDocument/2006/relationships" xmlns:p="http://schemas.openxmlformats.org/presentationml/2006/main">
+  <p:cSld>
+    <p:spTree>
+      <p:nvGrpSpPr>
+        <p:cNvPr id="1" name=""/>
+        <p:cNvGrpSpPr/>
+        <p:nvPr/>
+      </p:nvGrpSpPr>
+      <p:grpSpPr>
+        <a:xfrm>
+          <a:off x="0" y="0"/>
+          <a:ext cx="0" cy="0"/>
+          <a:chOff x="0" y="0"/>
+          <a:chExt cx="0" cy="0"/>
+        </a:xfrm>
+      </p:grpSpPr>
+      <p:sp>
+        <p:nvSpPr>
+          <p:cNvPr id="2" name="Title 1">
+            <a:extLst>
+              <a:ext uri="{FF2B5EF4-FFF2-40B4-BE49-F238E27FC236}">
+                <a16:creationId xmlns:a16="http://schemas.microsoft.com/office/drawing/2014/main" id="{361C8714-6583-2104-504C-3E5E102CB9AF}"/>
+              </a:ext>
+            </a:extLst>
+          </p:cNvPr>
+          <p:cNvSpPr>
+            <a:spLocks noGrp="1"/>
+          </p:cNvSpPr>
+          <p:nvPr>
+            <p:ph type="title"/>
+          </p:nvPr>
+        </p:nvSpPr>
+        <p:spPr/>
+        <p:txBody>
+          <a:bodyPr/>
+          <a:lstStyle/>
+          <a:p>
+            <a:endParaRPr lang="en-US"/>
+          </a:p>
+        </p:txBody>
+      </p:sp>
+      <p:sp>
+        <p:nvSpPr>
+          <p:cNvPr id="3" name="Content Placeholder 2">
+            <a:extLst>
+              <a:ext uri="{FF2B5EF4-FFF2-40B4-BE49-F238E27FC236}">
+                <a16:creationId xmlns:a16="http://schemas.microsoft.com/office/drawing/2014/main" id="{F70AF4A3-E021-26D0-2D90-78FB8486A2FD}"/>
+              </a:ext>
+            </a:extLst>
+          </p:cNvPr>
+          <p:cNvSpPr>
+            <a:spLocks noGrp="1"/>
+          </p:cNvSpPr>
+          <p:nvPr>
+            <p:ph idx="1"/>
+          </p:nvPr>
+        </p:nvSpPr>
+        <p:spPr/>
+        <p:txBody>
+          <a:bodyPr/>
+          <a:lstStyle/>
+          <a:p>
+            <a:endParaRPr lang="en-US"/>
+          </a:p>
+        </p:txBody>
+      </p:sp>
+      <p:pic>
+        <p:nvPicPr>
+          <p:cNvPr id="5" name="Picture 4">
+            <a:extLst>
+              <a:ext uri="{FF2B5EF4-FFF2-40B4-BE49-F238E27FC236}">
+                <a16:creationId xmlns:a16="http://schemas.microsoft.com/office/drawing/2014/main" id="{619D7898-8381-D27C-DC39-FA2CB4A5BFA4}"/>
+              </a:ext>
+            </a:extLst>
+          </p:cNvPr>
+          <p:cNvPicPr>
+            <a:picLocks noChangeAspect="1"/>
+          </p:cNvPicPr>
+          <p:nvPr/>
+        </p:nvPicPr>
+        <p:blipFill>
+          <a:blip r:embed="rId2"/>
+          <a:stretch>
+            <a:fillRect/>
+          </a:stretch>
+        </p:blipFill>
+        <p:spPr>
+          <a:xfrm>
+            <a:off x="0" y="0"/>
+            <a:ext cx="12192000" cy="6858000"/>
+          </a:xfrm>
+          <a:prstGeom prst="rect">
+            <a:avLst/>
+          </a:prstGeom>
+        </p:spPr>
+      </p:pic>
+    </p:spTree>
+    <p:extLst>
+      <p:ext uri="{BB962C8B-B14F-4D97-AF65-F5344CB8AC3E}">
+        <p14:creationId xmlns:p14="http://schemas.microsoft.com/office/powerpoint/2010/main" val="3911506528"/>
+      </p:ext>
+    </p:extLst>
+  </p:cSld>
+  <p:clrMapOvr>
+    <a:masterClrMapping/>
+  </p:clrMapOvr>
+</p:sld>
+</file>
+
+<file path=ppt/slides/slide8.xml><?xml version="1.0" encoding="utf-8"?>
+<p:sld xmlns:a="http://schemas.openxmlformats.org/drawingml/2006/main" xmlns:r="http://schemas.openxmlformats.org/officeDocument/2006/relationships" xmlns:p="http://schemas.openxmlformats.org/presentationml/2006/main">
+  <p:cSld>
+    <p:spTree>
+      <p:nvGrpSpPr>
+        <p:cNvPr id="1" name=""/>
+        <p:cNvGrpSpPr/>
+        <p:nvPr/>
+      </p:nvGrpSpPr>
+      <p:grpSpPr>
+        <a:xfrm>
+          <a:off x="0" y="0"/>
+          <a:ext cx="0" cy="0"/>
+          <a:chOff x="0" y="0"/>
+          <a:chExt cx="0" cy="0"/>
+        </a:xfrm>
+      </p:grpSpPr>
+      <p:sp>
+        <p:nvSpPr>
+          <p:cNvPr id="2" name="Title 1">
+            <a:extLst>
+              <a:ext uri="{FF2B5EF4-FFF2-40B4-BE49-F238E27FC236}">
+                <a16:creationId xmlns:a16="http://schemas.microsoft.com/office/drawing/2014/main" id="{42D4918E-4F6E-82AC-E118-B84AE47703A8}"/>
+              </a:ext>
+            </a:extLst>
+          </p:cNvPr>
+          <p:cNvSpPr>
+            <a:spLocks noGrp="1"/>
+          </p:cNvSpPr>
+          <p:nvPr>
+            <p:ph type="title"/>
+          </p:nvPr>
+        </p:nvSpPr>
+        <p:spPr/>
+        <p:txBody>
+          <a:bodyPr/>
+          <a:lstStyle/>
+          <a:p>
+            <a:endParaRPr lang="en-US"/>
+          </a:p>
+        </p:txBody>
+      </p:sp>
+      <p:sp>
+        <p:nvSpPr>
+          <p:cNvPr id="3" name="Content Placeholder 2">
+            <a:extLst>
+              <a:ext uri="{FF2B5EF4-FFF2-40B4-BE49-F238E27FC236}">
+                <a16:creationId xmlns:a16="http://schemas.microsoft.com/office/drawing/2014/main" id="{379884B7-2368-6F7A-1394-3CD253B982A8}"/>
+              </a:ext>
+            </a:extLst>
+          </p:cNvPr>
+          <p:cNvSpPr>
+            <a:spLocks noGrp="1"/>
+          </p:cNvSpPr>
+          <p:nvPr>
+            <p:ph idx="1"/>
+          </p:nvPr>
+        </p:nvSpPr>
+        <p:spPr/>
+        <p:txBody>
+          <a:bodyPr/>
+          <a:lstStyle/>
+          <a:p>
+            <a:endParaRPr lang="en-US"/>
+          </a:p>
+        </p:txBody>
+      </p:sp>
+      <p:pic>
+        <p:nvPicPr>
+          <p:cNvPr id="5" name="Picture 4">
+            <a:extLst>
+              <a:ext uri="{FF2B5EF4-FFF2-40B4-BE49-F238E27FC236}">
+                <a16:creationId xmlns:a16="http://schemas.microsoft.com/office/drawing/2014/main" id="{6A32F29E-6D55-A453-1C4E-BFE13A9C5D9C}"/>
+              </a:ext>
+            </a:extLst>
+          </p:cNvPr>
+          <p:cNvPicPr>
+            <a:picLocks noChangeAspect="1"/>
+          </p:cNvPicPr>
+          <p:nvPr/>
+        </p:nvPicPr>
+        <p:blipFill>
+          <a:blip r:embed="rId2"/>
+          <a:stretch>
+            <a:fillRect/>
+          </a:stretch>
+        </p:blipFill>
+        <p:spPr>
+          <a:xfrm>
+            <a:off x="0" y="0"/>
+            <a:ext cx="12192000" cy="6858000"/>
+          </a:xfrm>
+          <a:prstGeom prst="rect">
+            <a:avLst/>
+          </a:prstGeom>
+        </p:spPr>
+      </p:pic>
+    </p:spTree>
+    <p:extLst>
+      <p:ext uri="{BB962C8B-B14F-4D97-AF65-F5344CB8AC3E}">
+        <p14:creationId xmlns:p14="http://schemas.microsoft.com/office/powerpoint/2010/main" val="3393600542"/>
+      </p:ext>
+    </p:extLst>
+  </p:cSld>
+  <p:clrMapOvr>
+    <a:masterClrMapping/>
+  </p:clrMapOvr>
+</p:sld>
+</file>
+
+<file path=ppt/slides/slide9.xml><?xml version="1.0" encoding="utf-8"?>
+<p:sld xmlns:a="http://schemas.openxmlformats.org/drawingml/2006/main" xmlns:r="http://schemas.openxmlformats.org/officeDocument/2006/relationships" xmlns:p="http://schemas.openxmlformats.org/presentationml/2006/main">
+  <p:cSld>
+    <p:spTree>
+      <p:nvGrpSpPr>
+        <p:cNvPr id="1" name=""/>
+        <p:cNvGrpSpPr/>
+        <p:nvPr/>
+      </p:nvGrpSpPr>
+      <p:grpSpPr>
+        <a:xfrm>
+          <a:off x="0" y="0"/>
+          <a:ext cx="0" cy="0"/>
+          <a:chOff x="0" y="0"/>
+          <a:chExt cx="0" cy="0"/>
+        </a:xfrm>
+      </p:grpSpPr>
+      <p:sp>
+        <p:nvSpPr>
+          <p:cNvPr id="2" name="Title 1">
+            <a:extLst>
+              <a:ext uri="{FF2B5EF4-FFF2-40B4-BE49-F238E27FC236}">
+                <a16:creationId xmlns:a16="http://schemas.microsoft.com/office/drawing/2014/main" id="{47555BFA-8C9D-05A1-53D8-52C929F02008}"/>
+              </a:ext>
+            </a:extLst>
+          </p:cNvPr>
+          <p:cNvSpPr>
+            <a:spLocks noGrp="1"/>
+          </p:cNvSpPr>
+          <p:nvPr>
+            <p:ph type="title"/>
+          </p:nvPr>
+        </p:nvSpPr>
+        <p:spPr/>
+        <p:txBody>
+          <a:bodyPr/>
+          <a:lstStyle/>
+          <a:p>
+            <a:endParaRPr lang="en-US"/>
+          </a:p>
+        </p:txBody>
+      </p:sp>
+      <p:sp>
+        <p:nvSpPr>
+          <p:cNvPr id="3" name="Content Placeholder 2">
+            <a:extLst>
+              <a:ext uri="{FF2B5EF4-FFF2-40B4-BE49-F238E27FC236}">
+                <a16:creationId xmlns:a16="http://schemas.microsoft.com/office/drawing/2014/main" id="{B8587526-DB6A-7E8C-3148-30E419E661C7}"/>
+              </a:ext>
+            </a:extLst>
+          </p:cNvPr>
+          <p:cNvSpPr>
+            <a:spLocks noGrp="1"/>
+          </p:cNvSpPr>
+          <p:nvPr>
+            <p:ph idx="1"/>
+          </p:nvPr>
+        </p:nvSpPr>
+        <p:spPr/>
+        <p:txBody>
+          <a:bodyPr/>
+          <a:lstStyle/>
+          <a:p>
+            <a:endParaRPr lang="en-US"/>
+          </a:p>
+        </p:txBody>
+      </p:sp>
+      <p:pic>
+        <p:nvPicPr>
+          <p:cNvPr id="5" name="Picture 4">
+            <a:extLst>
+              <a:ext uri="{FF2B5EF4-FFF2-40B4-BE49-F238E27FC236}">
+                <a16:creationId xmlns:a16="http://schemas.microsoft.com/office/drawing/2014/main" id="{A451B941-D9BB-B68F-4317-5757AE8EACC3}"/>
+              </a:ext>
+            </a:extLst>
+          </p:cNvPr>
+          <p:cNvPicPr>
+            <a:picLocks noChangeAspect="1"/>
+          </p:cNvPicPr>
+          <p:nvPr/>
+        </p:nvPicPr>
+        <p:blipFill>
+          <a:blip r:embed="rId2"/>
+          <a:stretch>
+            <a:fillRect/>
+          </a:stretch>
+        </p:blipFill>
+        <p:spPr>
+          <a:xfrm>
+            <a:off x="0" y="0"/>
+            <a:ext cx="12192000" cy="6858000"/>
+          </a:xfrm>
+          <a:prstGeom prst="rect">
+            <a:avLst/>
+          </a:prstGeom>
+        </p:spPr>
+      </p:pic>
+    </p:spTree>
+    <p:extLst>
+      <p:ext uri="{BB962C8B-B14F-4D97-AF65-F5344CB8AC3E}">
+        <p14:creationId xmlns:p14="http://schemas.microsoft.com/office/powerpoint/2010/main" val="411735382"/>
       </p:ext>
     </p:extLst>
   </p:cSld>

</xml_diff>